<commit_message>
Fixing ppt, add mapreduce vs spark
</commit_message>
<xml_diff>
--- a/Presentation.pptx
+++ b/Presentation.pptx
@@ -10,20 +10,22 @@
     <p:sldId id="271" r:id="rId4"/>
     <p:sldId id="272" r:id="rId5"/>
     <p:sldId id="259" r:id="rId6"/>
-    <p:sldId id="260" r:id="rId7"/>
-    <p:sldId id="273" r:id="rId8"/>
-    <p:sldId id="261" r:id="rId9"/>
-    <p:sldId id="262" r:id="rId10"/>
-    <p:sldId id="263" r:id="rId11"/>
-    <p:sldId id="264" r:id="rId12"/>
-    <p:sldId id="265" r:id="rId13"/>
-    <p:sldId id="266" r:id="rId14"/>
-    <p:sldId id="267" r:id="rId15"/>
-    <p:sldId id="268" r:id="rId16"/>
-    <p:sldId id="269" r:id="rId17"/>
-    <p:sldId id="270" r:id="rId18"/>
-    <p:sldId id="274" r:id="rId19"/>
-    <p:sldId id="275" r:id="rId20"/>
+    <p:sldId id="276" r:id="rId7"/>
+    <p:sldId id="260" r:id="rId8"/>
+    <p:sldId id="277" r:id="rId9"/>
+    <p:sldId id="278" r:id="rId10"/>
+    <p:sldId id="261" r:id="rId11"/>
+    <p:sldId id="262" r:id="rId12"/>
+    <p:sldId id="263" r:id="rId13"/>
+    <p:sldId id="264" r:id="rId14"/>
+    <p:sldId id="265" r:id="rId15"/>
+    <p:sldId id="266" r:id="rId16"/>
+    <p:sldId id="267" r:id="rId17"/>
+    <p:sldId id="268" r:id="rId18"/>
+    <p:sldId id="269" r:id="rId19"/>
+    <p:sldId id="270" r:id="rId20"/>
+    <p:sldId id="274" r:id="rId21"/>
+    <p:sldId id="275" r:id="rId22"/>
   </p:sldIdLst>
   <p:sldSz cx="12192000" cy="6858000"/>
   <p:notesSz cx="6858000" cy="9144000"/>
@@ -269,7 +271,7 @@
           <a:p>
             <a:fld id="{81B8F32D-D8B6-4B9E-9CBF-DCAC30B7B93D}" type="datetimeFigureOut">
               <a:rPr lang="en-US" smtClean="0"/>
-              <a:t>5/22/23</a:t>
+              <a:t>5/31/2023</a:t>
             </a:fld>
             <a:endParaRPr lang="en-US"/>
           </a:p>
@@ -480,7 +482,7 @@
           <a:p>
             <a:fld id="{81B8F32D-D8B6-4B9E-9CBF-DCAC30B7B93D}" type="datetimeFigureOut">
               <a:rPr lang="en-US" smtClean="0"/>
-              <a:t>5/22/23</a:t>
+              <a:t>5/31/2023</a:t>
             </a:fld>
             <a:endParaRPr lang="en-US"/>
           </a:p>
@@ -695,7 +697,7 @@
           <a:p>
             <a:fld id="{81B8F32D-D8B6-4B9E-9CBF-DCAC30B7B93D}" type="datetimeFigureOut">
               <a:rPr lang="en-US" smtClean="0"/>
-              <a:t>5/22/23</a:t>
+              <a:t>5/31/2023</a:t>
             </a:fld>
             <a:endParaRPr lang="en-US"/>
           </a:p>
@@ -896,7 +898,7 @@
           <a:p>
             <a:fld id="{81B8F32D-D8B6-4B9E-9CBF-DCAC30B7B93D}" type="datetimeFigureOut">
               <a:rPr lang="en-US" smtClean="0"/>
-              <a:t>5/22/23</a:t>
+              <a:t>5/31/2023</a:t>
             </a:fld>
             <a:endParaRPr lang="en-US"/>
           </a:p>
@@ -1175,7 +1177,7 @@
           <a:p>
             <a:fld id="{81B8F32D-D8B6-4B9E-9CBF-DCAC30B7B93D}" type="datetimeFigureOut">
               <a:rPr lang="en-US" smtClean="0"/>
-              <a:t>5/22/23</a:t>
+              <a:t>5/31/2023</a:t>
             </a:fld>
             <a:endParaRPr lang="en-US"/>
           </a:p>
@@ -1443,7 +1445,7 @@
           <a:p>
             <a:fld id="{81B8F32D-D8B6-4B9E-9CBF-DCAC30B7B93D}" type="datetimeFigureOut">
               <a:rPr lang="en-US" smtClean="0"/>
-              <a:t>5/22/23</a:t>
+              <a:t>5/31/2023</a:t>
             </a:fld>
             <a:endParaRPr lang="en-US"/>
           </a:p>
@@ -1859,7 +1861,7 @@
           <a:p>
             <a:fld id="{81B8F32D-D8B6-4B9E-9CBF-DCAC30B7B93D}" type="datetimeFigureOut">
               <a:rPr lang="en-US" smtClean="0"/>
-              <a:t>5/22/23</a:t>
+              <a:t>5/31/2023</a:t>
             </a:fld>
             <a:endParaRPr lang="en-US"/>
           </a:p>
@@ -2008,7 +2010,7 @@
           <a:p>
             <a:fld id="{81B8F32D-D8B6-4B9E-9CBF-DCAC30B7B93D}" type="datetimeFigureOut">
               <a:rPr lang="en-US" smtClean="0"/>
-              <a:t>5/22/23</a:t>
+              <a:t>5/31/2023</a:t>
             </a:fld>
             <a:endParaRPr lang="en-US"/>
           </a:p>
@@ -2134,7 +2136,7 @@
           <a:p>
             <a:fld id="{81B8F32D-D8B6-4B9E-9CBF-DCAC30B7B93D}" type="datetimeFigureOut">
               <a:rPr lang="en-US" smtClean="0"/>
-              <a:t>5/22/23</a:t>
+              <a:t>5/31/2023</a:t>
             </a:fld>
             <a:endParaRPr lang="en-US"/>
           </a:p>
@@ -2385,7 +2387,7 @@
           <a:p>
             <a:fld id="{81B8F32D-D8B6-4B9E-9CBF-DCAC30B7B93D}" type="datetimeFigureOut">
               <a:rPr lang="en-US" smtClean="0"/>
-              <a:t>5/22/23</a:t>
+              <a:t>5/31/2023</a:t>
             </a:fld>
             <a:endParaRPr lang="en-US"/>
           </a:p>
@@ -2830,7 +2832,7 @@
           <a:p>
             <a:fld id="{81B8F32D-D8B6-4B9E-9CBF-DCAC30B7B93D}" type="datetimeFigureOut">
               <a:rPr lang="en-US" smtClean="0"/>
-              <a:t>5/22/23</a:t>
+              <a:t>5/31/2023</a:t>
             </a:fld>
             <a:endParaRPr lang="en-US"/>
           </a:p>
@@ -3158,7 +3160,7 @@
             <a:fld id="{81B8F32D-D8B6-4B9E-9CBF-DCAC30B7B93D}" type="datetimeFigureOut">
               <a:rPr lang="en-US" smtClean="0"/>
               <a:pPr/>
-              <a:t>5/22/23</a:t>
+              <a:t>5/31/2023</a:t>
             </a:fld>
             <a:endParaRPr lang="en-US" dirty="0"/>
           </a:p>
@@ -3773,6 +3775,270 @@
           <p:cNvPr id="2" name="Title 1">
             <a:extLst>
               <a:ext uri="{FF2B5EF4-FFF2-40B4-BE49-F238E27FC236}">
+                <a16:creationId xmlns:a16="http://schemas.microsoft.com/office/drawing/2014/main" id="{17CB2D62-82EA-3B8E-30FF-85AF5991998D}"/>
+              </a:ext>
+            </a:extLst>
+          </p:cNvPr>
+          <p:cNvSpPr>
+            <a:spLocks noGrp="1"/>
+          </p:cNvSpPr>
+          <p:nvPr>
+            <p:ph type="title"/>
+          </p:nvPr>
+        </p:nvSpPr>
+        <p:spPr/>
+        <p:txBody>
+          <a:bodyPr/>
+          <a:lstStyle/>
+          <a:p>
+            <a:r>
+              <a:rPr lang="en-US" dirty="0"/>
+              <a:t>Why Spark and </a:t>
+            </a:r>
+            <a:r>
+              <a:rPr lang="en-US" dirty="0" err="1"/>
+              <a:t>SparkML</a:t>
+            </a:r>
+            <a:endParaRPr lang="en-US" dirty="0"/>
+          </a:p>
+        </p:txBody>
+      </p:sp>
+      <p:sp>
+        <p:nvSpPr>
+          <p:cNvPr id="3" name="Content Placeholder 2">
+            <a:extLst>
+              <a:ext uri="{FF2B5EF4-FFF2-40B4-BE49-F238E27FC236}">
+                <a16:creationId xmlns:a16="http://schemas.microsoft.com/office/drawing/2014/main" id="{C06DFFED-748B-E3F7-12C8-054BEB602AF9}"/>
+              </a:ext>
+            </a:extLst>
+          </p:cNvPr>
+          <p:cNvSpPr>
+            <a:spLocks noGrp="1"/>
+          </p:cNvSpPr>
+          <p:nvPr>
+            <p:ph idx="1"/>
+          </p:nvPr>
+        </p:nvSpPr>
+        <p:spPr/>
+        <p:txBody>
+          <a:bodyPr/>
+          <a:lstStyle/>
+          <a:p>
+            <a:r>
+              <a:rPr lang="en-US" dirty="0"/>
+              <a:t>Spark and Spark ML perform better for bigger dataset compared to traditional model library such as </a:t>
+            </a:r>
+            <a:r>
+              <a:rPr lang="en-US" dirty="0" err="1"/>
+              <a:t>SkLearn</a:t>
+            </a:r>
+            <a:endParaRPr lang="en-US" dirty="0"/>
+          </a:p>
+          <a:p>
+            <a:r>
+              <a:rPr lang="en-US" dirty="0"/>
+              <a:t>Good integration with Google Cloud</a:t>
+            </a:r>
+          </a:p>
+          <a:p>
+            <a:r>
+              <a:rPr lang="en-US" dirty="0"/>
+              <a:t>Easy scalability: modifying the numbers of workers is 1 line of code</a:t>
+            </a:r>
+          </a:p>
+        </p:txBody>
+      </p:sp>
+      <p:pic>
+        <p:nvPicPr>
+          <p:cNvPr id="4" name="Picture 3">
+            <a:extLst>
+              <a:ext uri="{FF2B5EF4-FFF2-40B4-BE49-F238E27FC236}">
+                <a16:creationId xmlns:a16="http://schemas.microsoft.com/office/drawing/2014/main" id="{771CD00C-EDCD-7E46-0B18-FAFCD67B648F}"/>
+              </a:ext>
+            </a:extLst>
+          </p:cNvPr>
+          <p:cNvPicPr>
+            <a:picLocks noChangeAspect="1"/>
+          </p:cNvPicPr>
+          <p:nvPr/>
+        </p:nvPicPr>
+        <p:blipFill>
+          <a:blip r:embed="rId2"/>
+          <a:stretch>
+            <a:fillRect/>
+          </a:stretch>
+        </p:blipFill>
+        <p:spPr>
+          <a:xfrm>
+            <a:off x="1832102" y="3805682"/>
+            <a:ext cx="5930900" cy="673100"/>
+          </a:xfrm>
+          <a:prstGeom prst="rect">
+            <a:avLst/>
+          </a:prstGeom>
+        </p:spPr>
+      </p:pic>
+    </p:spTree>
+    <p:extLst>
+      <p:ext uri="{BB962C8B-B14F-4D97-AF65-F5344CB8AC3E}">
+        <p14:creationId xmlns:p14="http://schemas.microsoft.com/office/powerpoint/2010/main" val="2785348309"/>
+      </p:ext>
+    </p:extLst>
+  </p:cSld>
+  <p:clrMapOvr>
+    <a:masterClrMapping/>
+  </p:clrMapOvr>
+</p:sld>
+</file>
+
+<file path=ppt/slides/slide11.xml><?xml version="1.0" encoding="utf-8"?>
+<p:sld xmlns:a="http://schemas.openxmlformats.org/drawingml/2006/main" xmlns:r="http://schemas.openxmlformats.org/officeDocument/2006/relationships" xmlns:p="http://schemas.openxmlformats.org/presentationml/2006/main">
+  <p:cSld>
+    <p:spTree>
+      <p:nvGrpSpPr>
+        <p:cNvPr id="1" name=""/>
+        <p:cNvGrpSpPr/>
+        <p:nvPr/>
+      </p:nvGrpSpPr>
+      <p:grpSpPr>
+        <a:xfrm>
+          <a:off x="0" y="0"/>
+          <a:ext cx="0" cy="0"/>
+          <a:chOff x="0" y="0"/>
+          <a:chExt cx="0" cy="0"/>
+        </a:xfrm>
+      </p:grpSpPr>
+      <p:sp>
+        <p:nvSpPr>
+          <p:cNvPr id="2" name="Title 1">
+            <a:extLst>
+              <a:ext uri="{FF2B5EF4-FFF2-40B4-BE49-F238E27FC236}">
+                <a16:creationId xmlns:a16="http://schemas.microsoft.com/office/drawing/2014/main" id="{2528BF60-725A-BE17-4864-8FF6236313A4}"/>
+              </a:ext>
+            </a:extLst>
+          </p:cNvPr>
+          <p:cNvSpPr>
+            <a:spLocks noGrp="1"/>
+          </p:cNvSpPr>
+          <p:nvPr>
+            <p:ph type="title"/>
+          </p:nvPr>
+        </p:nvSpPr>
+        <p:spPr/>
+        <p:txBody>
+          <a:bodyPr/>
+          <a:lstStyle/>
+          <a:p>
+            <a:r>
+              <a:rPr lang="en-US" dirty="0"/>
+              <a:t>Machine learning models chosen</a:t>
+            </a:r>
+          </a:p>
+        </p:txBody>
+      </p:sp>
+      <p:sp>
+        <p:nvSpPr>
+          <p:cNvPr id="3" name="Content Placeholder 2">
+            <a:extLst>
+              <a:ext uri="{FF2B5EF4-FFF2-40B4-BE49-F238E27FC236}">
+                <a16:creationId xmlns:a16="http://schemas.microsoft.com/office/drawing/2014/main" id="{A7EF225D-6E39-C6D2-90E4-EA6FE3A1C050}"/>
+              </a:ext>
+            </a:extLst>
+          </p:cNvPr>
+          <p:cNvSpPr>
+            <a:spLocks noGrp="1"/>
+          </p:cNvSpPr>
+          <p:nvPr>
+            <p:ph idx="1"/>
+          </p:nvPr>
+        </p:nvSpPr>
+        <p:spPr/>
+        <p:txBody>
+          <a:bodyPr/>
+          <a:lstStyle/>
+          <a:p>
+            <a:r>
+              <a:rPr lang="en-US" dirty="0"/>
+              <a:t>Logistic Regression </a:t>
+            </a:r>
+          </a:p>
+          <a:p>
+            <a:r>
+              <a:rPr lang="en-US" dirty="0"/>
+              <a:t>Decision Tree Classifier</a:t>
+            </a:r>
+          </a:p>
+          <a:p>
+            <a:r>
+              <a:rPr lang="en-US" dirty="0"/>
+              <a:t>Random Forest Classifier</a:t>
+            </a:r>
+          </a:p>
+          <a:p>
+            <a:r>
+              <a:rPr lang="en-US" dirty="0"/>
+              <a:t>Gradient Boosted Classifier</a:t>
+            </a:r>
+          </a:p>
+          <a:p>
+            <a:r>
+              <a:rPr lang="en-US" dirty="0"/>
+              <a:t>Linear Support Vector Machine</a:t>
+            </a:r>
+          </a:p>
+          <a:p>
+            <a:r>
+              <a:rPr lang="en-US" dirty="0" err="1"/>
+              <a:t>Naives</a:t>
+            </a:r>
+            <a:r>
+              <a:rPr lang="en-US" dirty="0"/>
+              <a:t> Bayes</a:t>
+            </a:r>
+          </a:p>
+          <a:p>
+            <a:r>
+              <a:rPr lang="en-US" dirty="0"/>
+              <a:t>Factorization Machine Classifier</a:t>
+            </a:r>
+          </a:p>
+        </p:txBody>
+      </p:sp>
+    </p:spTree>
+    <p:extLst>
+      <p:ext uri="{BB962C8B-B14F-4D97-AF65-F5344CB8AC3E}">
+        <p14:creationId xmlns:p14="http://schemas.microsoft.com/office/powerpoint/2010/main" val="3064752663"/>
+      </p:ext>
+    </p:extLst>
+  </p:cSld>
+  <p:clrMapOvr>
+    <a:masterClrMapping/>
+  </p:clrMapOvr>
+</p:sld>
+</file>
+
+<file path=ppt/slides/slide12.xml><?xml version="1.0" encoding="utf-8"?>
+<p:sld xmlns:a="http://schemas.openxmlformats.org/drawingml/2006/main" xmlns:r="http://schemas.openxmlformats.org/officeDocument/2006/relationships" xmlns:p="http://schemas.openxmlformats.org/presentationml/2006/main">
+  <p:cSld>
+    <p:spTree>
+      <p:nvGrpSpPr>
+        <p:cNvPr id="1" name=""/>
+        <p:cNvGrpSpPr/>
+        <p:nvPr/>
+      </p:nvGrpSpPr>
+      <p:grpSpPr>
+        <a:xfrm>
+          <a:off x="0" y="0"/>
+          <a:ext cx="0" cy="0"/>
+          <a:chOff x="0" y="0"/>
+          <a:chExt cx="0" cy="0"/>
+        </a:xfrm>
+      </p:grpSpPr>
+      <p:sp>
+        <p:nvSpPr>
+          <p:cNvPr id="2" name="Title 1">
+            <a:extLst>
+              <a:ext uri="{FF2B5EF4-FFF2-40B4-BE49-F238E27FC236}">
                 <a16:creationId xmlns:a16="http://schemas.microsoft.com/office/drawing/2014/main" id="{0FE09437-8373-D911-4812-615B8930B6C8}"/>
               </a:ext>
             </a:extLst>
@@ -3867,7 +4133,7 @@
 </p:sld>
 </file>
 
-<file path=ppt/slides/slide11.xml><?xml version="1.0" encoding="utf-8"?>
+<file path=ppt/slides/slide13.xml><?xml version="1.0" encoding="utf-8"?>
 <p:sld xmlns:a="http://schemas.openxmlformats.org/drawingml/2006/main" xmlns:r="http://schemas.openxmlformats.org/officeDocument/2006/relationships" xmlns:p="http://schemas.openxmlformats.org/presentationml/2006/main">
   <p:cSld>
     <p:spTree>
@@ -3989,196 +4255,6 @@
 </p:sld>
 </file>
 
-<file path=ppt/slides/slide12.xml><?xml version="1.0" encoding="utf-8"?>
-<p:sld xmlns:a="http://schemas.openxmlformats.org/drawingml/2006/main" xmlns:r="http://schemas.openxmlformats.org/officeDocument/2006/relationships" xmlns:p="http://schemas.openxmlformats.org/presentationml/2006/main">
-  <p:cSld>
-    <p:spTree>
-      <p:nvGrpSpPr>
-        <p:cNvPr id="1" name=""/>
-        <p:cNvGrpSpPr/>
-        <p:nvPr/>
-      </p:nvGrpSpPr>
-      <p:grpSpPr>
-        <a:xfrm>
-          <a:off x="0" y="0"/>
-          <a:ext cx="0" cy="0"/>
-          <a:chOff x="0" y="0"/>
-          <a:chExt cx="0" cy="0"/>
-        </a:xfrm>
-      </p:grpSpPr>
-      <p:sp>
-        <p:nvSpPr>
-          <p:cNvPr id="2" name="Title 1">
-            <a:extLst>
-              <a:ext uri="{FF2B5EF4-FFF2-40B4-BE49-F238E27FC236}">
-                <a16:creationId xmlns:a16="http://schemas.microsoft.com/office/drawing/2014/main" id="{40631B9F-448A-37E8-F97B-D8BBA58C5CE5}"/>
-              </a:ext>
-            </a:extLst>
-          </p:cNvPr>
-          <p:cNvSpPr>
-            <a:spLocks noGrp="1"/>
-          </p:cNvSpPr>
-          <p:nvPr>
-            <p:ph type="title"/>
-          </p:nvPr>
-        </p:nvSpPr>
-        <p:spPr/>
-        <p:txBody>
-          <a:bodyPr/>
-          <a:lstStyle/>
-          <a:p>
-            <a:r>
-              <a:rPr lang="en-US" dirty="0"/>
-              <a:t>Random Forest	</a:t>
-            </a:r>
-          </a:p>
-        </p:txBody>
-      </p:sp>
-      <p:sp>
-        <p:nvSpPr>
-          <p:cNvPr id="3" name="Content Placeholder 2">
-            <a:extLst>
-              <a:ext uri="{FF2B5EF4-FFF2-40B4-BE49-F238E27FC236}">
-                <a16:creationId xmlns:a16="http://schemas.microsoft.com/office/drawing/2014/main" id="{0509869D-F4A9-7E54-E233-6D5104EAFBEB}"/>
-              </a:ext>
-            </a:extLst>
-          </p:cNvPr>
-          <p:cNvSpPr>
-            <a:spLocks noGrp="1"/>
-          </p:cNvSpPr>
-          <p:nvPr>
-            <p:ph idx="1"/>
-          </p:nvPr>
-        </p:nvSpPr>
-        <p:spPr/>
-        <p:txBody>
-          <a:bodyPr/>
-          <a:lstStyle/>
-          <a:p>
-            <a:r>
-              <a:rPr lang="en-US" dirty="0"/>
-              <a:t>Use multiple decision tree to improve the accuracy</a:t>
-            </a:r>
-          </a:p>
-          <a:p>
-            <a:r>
-              <a:rPr lang="en-US" dirty="0"/>
-              <a:t>Randomly select subset of data to train each decision tree.</a:t>
-            </a:r>
-          </a:p>
-          <a:p>
-            <a:r>
-              <a:rPr lang="en-US" dirty="0"/>
-              <a:t>Combine each tree prediction to make final decision</a:t>
-            </a:r>
-          </a:p>
-        </p:txBody>
-      </p:sp>
-    </p:spTree>
-    <p:extLst>
-      <p:ext uri="{BB962C8B-B14F-4D97-AF65-F5344CB8AC3E}">
-        <p14:creationId xmlns:p14="http://schemas.microsoft.com/office/powerpoint/2010/main" val="3397351659"/>
-      </p:ext>
-    </p:extLst>
-  </p:cSld>
-  <p:clrMapOvr>
-    <a:masterClrMapping/>
-  </p:clrMapOvr>
-</p:sld>
-</file>
-
-<file path=ppt/slides/slide13.xml><?xml version="1.0" encoding="utf-8"?>
-<p:sld xmlns:a="http://schemas.openxmlformats.org/drawingml/2006/main" xmlns:r="http://schemas.openxmlformats.org/officeDocument/2006/relationships" xmlns:p="http://schemas.openxmlformats.org/presentationml/2006/main">
-  <p:cSld>
-    <p:spTree>
-      <p:nvGrpSpPr>
-        <p:cNvPr id="1" name=""/>
-        <p:cNvGrpSpPr/>
-        <p:nvPr/>
-      </p:nvGrpSpPr>
-      <p:grpSpPr>
-        <a:xfrm>
-          <a:off x="0" y="0"/>
-          <a:ext cx="0" cy="0"/>
-          <a:chOff x="0" y="0"/>
-          <a:chExt cx="0" cy="0"/>
-        </a:xfrm>
-      </p:grpSpPr>
-      <p:sp>
-        <p:nvSpPr>
-          <p:cNvPr id="2" name="Title 1">
-            <a:extLst>
-              <a:ext uri="{FF2B5EF4-FFF2-40B4-BE49-F238E27FC236}">
-                <a16:creationId xmlns:a16="http://schemas.microsoft.com/office/drawing/2014/main" id="{10967EE5-F49D-E86C-07D4-CB23A101BAD1}"/>
-              </a:ext>
-            </a:extLst>
-          </p:cNvPr>
-          <p:cNvSpPr>
-            <a:spLocks noGrp="1"/>
-          </p:cNvSpPr>
-          <p:nvPr>
-            <p:ph type="title"/>
-          </p:nvPr>
-        </p:nvSpPr>
-        <p:spPr/>
-        <p:txBody>
-          <a:bodyPr/>
-          <a:lstStyle/>
-          <a:p>
-            <a:r>
-              <a:rPr lang="en-US" dirty="0"/>
-              <a:t>Gradient Boosted Classifier</a:t>
-            </a:r>
-          </a:p>
-        </p:txBody>
-      </p:sp>
-      <p:sp>
-        <p:nvSpPr>
-          <p:cNvPr id="3" name="Content Placeholder 2">
-            <a:extLst>
-              <a:ext uri="{FF2B5EF4-FFF2-40B4-BE49-F238E27FC236}">
-                <a16:creationId xmlns:a16="http://schemas.microsoft.com/office/drawing/2014/main" id="{4DBF4885-5E2E-6210-2AF2-6135D69E1479}"/>
-              </a:ext>
-            </a:extLst>
-          </p:cNvPr>
-          <p:cNvSpPr>
-            <a:spLocks noGrp="1"/>
-          </p:cNvSpPr>
-          <p:nvPr>
-            <p:ph idx="1"/>
-          </p:nvPr>
-        </p:nvSpPr>
-        <p:spPr/>
-        <p:txBody>
-          <a:bodyPr/>
-          <a:lstStyle/>
-          <a:p>
-            <a:r>
-              <a:rPr lang="en-US" dirty="0"/>
-              <a:t>Use multiple decision tree to improve classification performance</a:t>
-            </a:r>
-          </a:p>
-          <a:p>
-            <a:r>
-              <a:rPr lang="en-US" dirty="0"/>
-              <a:t>Trees are builds in sequence, each tree improve upon previous tree.</a:t>
-            </a:r>
-          </a:p>
-        </p:txBody>
-      </p:sp>
-    </p:spTree>
-    <p:extLst>
-      <p:ext uri="{BB962C8B-B14F-4D97-AF65-F5344CB8AC3E}">
-        <p14:creationId xmlns:p14="http://schemas.microsoft.com/office/powerpoint/2010/main" val="2417224525"/>
-      </p:ext>
-    </p:extLst>
-  </p:cSld>
-  <p:clrMapOvr>
-    <a:masterClrMapping/>
-  </p:clrMapOvr>
-</p:sld>
-</file>
-
 <file path=ppt/slides/slide14.xml><?xml version="1.0" encoding="utf-8"?>
 <p:sld xmlns:a="http://schemas.openxmlformats.org/drawingml/2006/main" xmlns:r="http://schemas.openxmlformats.org/officeDocument/2006/relationships" xmlns:p="http://schemas.openxmlformats.org/presentationml/2006/main">
   <p:cSld>
@@ -4201,6 +4277,196 @@
           <p:cNvPr id="2" name="Title 1">
             <a:extLst>
               <a:ext uri="{FF2B5EF4-FFF2-40B4-BE49-F238E27FC236}">
+                <a16:creationId xmlns:a16="http://schemas.microsoft.com/office/drawing/2014/main" id="{40631B9F-448A-37E8-F97B-D8BBA58C5CE5}"/>
+              </a:ext>
+            </a:extLst>
+          </p:cNvPr>
+          <p:cNvSpPr>
+            <a:spLocks noGrp="1"/>
+          </p:cNvSpPr>
+          <p:nvPr>
+            <p:ph type="title"/>
+          </p:nvPr>
+        </p:nvSpPr>
+        <p:spPr/>
+        <p:txBody>
+          <a:bodyPr/>
+          <a:lstStyle/>
+          <a:p>
+            <a:r>
+              <a:rPr lang="en-US" dirty="0"/>
+              <a:t>Random Forest	</a:t>
+            </a:r>
+          </a:p>
+        </p:txBody>
+      </p:sp>
+      <p:sp>
+        <p:nvSpPr>
+          <p:cNvPr id="3" name="Content Placeholder 2">
+            <a:extLst>
+              <a:ext uri="{FF2B5EF4-FFF2-40B4-BE49-F238E27FC236}">
+                <a16:creationId xmlns:a16="http://schemas.microsoft.com/office/drawing/2014/main" id="{0509869D-F4A9-7E54-E233-6D5104EAFBEB}"/>
+              </a:ext>
+            </a:extLst>
+          </p:cNvPr>
+          <p:cNvSpPr>
+            <a:spLocks noGrp="1"/>
+          </p:cNvSpPr>
+          <p:nvPr>
+            <p:ph idx="1"/>
+          </p:nvPr>
+        </p:nvSpPr>
+        <p:spPr/>
+        <p:txBody>
+          <a:bodyPr/>
+          <a:lstStyle/>
+          <a:p>
+            <a:r>
+              <a:rPr lang="en-US" dirty="0"/>
+              <a:t>Use multiple decision tree to improve the accuracy</a:t>
+            </a:r>
+          </a:p>
+          <a:p>
+            <a:r>
+              <a:rPr lang="en-US" dirty="0"/>
+              <a:t>Randomly select subset of data to train each decision tree.</a:t>
+            </a:r>
+          </a:p>
+          <a:p>
+            <a:r>
+              <a:rPr lang="en-US" dirty="0"/>
+              <a:t>Combine each tree prediction to make final decision</a:t>
+            </a:r>
+          </a:p>
+        </p:txBody>
+      </p:sp>
+    </p:spTree>
+    <p:extLst>
+      <p:ext uri="{BB962C8B-B14F-4D97-AF65-F5344CB8AC3E}">
+        <p14:creationId xmlns:p14="http://schemas.microsoft.com/office/powerpoint/2010/main" val="3397351659"/>
+      </p:ext>
+    </p:extLst>
+  </p:cSld>
+  <p:clrMapOvr>
+    <a:masterClrMapping/>
+  </p:clrMapOvr>
+</p:sld>
+</file>
+
+<file path=ppt/slides/slide15.xml><?xml version="1.0" encoding="utf-8"?>
+<p:sld xmlns:a="http://schemas.openxmlformats.org/drawingml/2006/main" xmlns:r="http://schemas.openxmlformats.org/officeDocument/2006/relationships" xmlns:p="http://schemas.openxmlformats.org/presentationml/2006/main">
+  <p:cSld>
+    <p:spTree>
+      <p:nvGrpSpPr>
+        <p:cNvPr id="1" name=""/>
+        <p:cNvGrpSpPr/>
+        <p:nvPr/>
+      </p:nvGrpSpPr>
+      <p:grpSpPr>
+        <a:xfrm>
+          <a:off x="0" y="0"/>
+          <a:ext cx="0" cy="0"/>
+          <a:chOff x="0" y="0"/>
+          <a:chExt cx="0" cy="0"/>
+        </a:xfrm>
+      </p:grpSpPr>
+      <p:sp>
+        <p:nvSpPr>
+          <p:cNvPr id="2" name="Title 1">
+            <a:extLst>
+              <a:ext uri="{FF2B5EF4-FFF2-40B4-BE49-F238E27FC236}">
+                <a16:creationId xmlns:a16="http://schemas.microsoft.com/office/drawing/2014/main" id="{10967EE5-F49D-E86C-07D4-CB23A101BAD1}"/>
+              </a:ext>
+            </a:extLst>
+          </p:cNvPr>
+          <p:cNvSpPr>
+            <a:spLocks noGrp="1"/>
+          </p:cNvSpPr>
+          <p:nvPr>
+            <p:ph type="title"/>
+          </p:nvPr>
+        </p:nvSpPr>
+        <p:spPr/>
+        <p:txBody>
+          <a:bodyPr/>
+          <a:lstStyle/>
+          <a:p>
+            <a:r>
+              <a:rPr lang="en-US" dirty="0"/>
+              <a:t>Gradient Boosted Classifier</a:t>
+            </a:r>
+          </a:p>
+        </p:txBody>
+      </p:sp>
+      <p:sp>
+        <p:nvSpPr>
+          <p:cNvPr id="3" name="Content Placeholder 2">
+            <a:extLst>
+              <a:ext uri="{FF2B5EF4-FFF2-40B4-BE49-F238E27FC236}">
+                <a16:creationId xmlns:a16="http://schemas.microsoft.com/office/drawing/2014/main" id="{4DBF4885-5E2E-6210-2AF2-6135D69E1479}"/>
+              </a:ext>
+            </a:extLst>
+          </p:cNvPr>
+          <p:cNvSpPr>
+            <a:spLocks noGrp="1"/>
+          </p:cNvSpPr>
+          <p:nvPr>
+            <p:ph idx="1"/>
+          </p:nvPr>
+        </p:nvSpPr>
+        <p:spPr/>
+        <p:txBody>
+          <a:bodyPr/>
+          <a:lstStyle/>
+          <a:p>
+            <a:r>
+              <a:rPr lang="en-US" dirty="0"/>
+              <a:t>Use multiple decision tree to improve classification performance</a:t>
+            </a:r>
+          </a:p>
+          <a:p>
+            <a:r>
+              <a:rPr lang="en-US" dirty="0"/>
+              <a:t>Trees are builds in sequence, each tree improve upon previous tree.</a:t>
+            </a:r>
+          </a:p>
+        </p:txBody>
+      </p:sp>
+    </p:spTree>
+    <p:extLst>
+      <p:ext uri="{BB962C8B-B14F-4D97-AF65-F5344CB8AC3E}">
+        <p14:creationId xmlns:p14="http://schemas.microsoft.com/office/powerpoint/2010/main" val="2417224525"/>
+      </p:ext>
+    </p:extLst>
+  </p:cSld>
+  <p:clrMapOvr>
+    <a:masterClrMapping/>
+  </p:clrMapOvr>
+</p:sld>
+</file>
+
+<file path=ppt/slides/slide16.xml><?xml version="1.0" encoding="utf-8"?>
+<p:sld xmlns:a="http://schemas.openxmlformats.org/drawingml/2006/main" xmlns:r="http://schemas.openxmlformats.org/officeDocument/2006/relationships" xmlns:p="http://schemas.openxmlformats.org/presentationml/2006/main">
+  <p:cSld>
+    <p:spTree>
+      <p:nvGrpSpPr>
+        <p:cNvPr id="1" name=""/>
+        <p:cNvGrpSpPr/>
+        <p:nvPr/>
+      </p:nvGrpSpPr>
+      <p:grpSpPr>
+        <a:xfrm>
+          <a:off x="0" y="0"/>
+          <a:ext cx="0" cy="0"/>
+          <a:chOff x="0" y="0"/>
+          <a:chExt cx="0" cy="0"/>
+        </a:xfrm>
+      </p:grpSpPr>
+      <p:sp>
+        <p:nvSpPr>
+          <p:cNvPr id="2" name="Title 1">
+            <a:extLst>
+              <a:ext uri="{FF2B5EF4-FFF2-40B4-BE49-F238E27FC236}">
                 <a16:creationId xmlns:a16="http://schemas.microsoft.com/office/drawing/2014/main" id="{23FF42CF-99F7-0B7A-42EF-7DCF5CE5875F}"/>
               </a:ext>
             </a:extLst>
@@ -4277,7 +4543,7 @@
 </p:sld>
 </file>
 
-<file path=ppt/slides/slide15.xml><?xml version="1.0" encoding="utf-8"?>
+<file path=ppt/slides/slide17.xml><?xml version="1.0" encoding="utf-8"?>
 <p:sld xmlns:a="http://schemas.openxmlformats.org/drawingml/2006/main" xmlns:r="http://schemas.openxmlformats.org/officeDocument/2006/relationships" xmlns:p="http://schemas.openxmlformats.org/presentationml/2006/main">
   <p:cSld>
     <p:spTree>
@@ -4565,7 +4831,7 @@
 </p:sld>
 </file>
 
-<file path=ppt/slides/slide16.xml><?xml version="1.0" encoding="utf-8"?>
+<file path=ppt/slides/slide18.xml><?xml version="1.0" encoding="utf-8"?>
 <p:sld xmlns:a="http://schemas.openxmlformats.org/drawingml/2006/main" xmlns:r="http://schemas.openxmlformats.org/officeDocument/2006/relationships" xmlns:p="http://schemas.openxmlformats.org/presentationml/2006/main">
   <p:cSld>
     <p:spTree>
@@ -4690,230 +4956,6 @@
 </p:sld>
 </file>
 
-<file path=ppt/slides/slide17.xml><?xml version="1.0" encoding="utf-8"?>
-<p:sld xmlns:a="http://schemas.openxmlformats.org/drawingml/2006/main" xmlns:r="http://schemas.openxmlformats.org/officeDocument/2006/relationships" xmlns:p="http://schemas.openxmlformats.org/presentationml/2006/main">
-  <p:cSld>
-    <p:spTree>
-      <p:nvGrpSpPr>
-        <p:cNvPr id="1" name=""/>
-        <p:cNvGrpSpPr/>
-        <p:nvPr/>
-      </p:nvGrpSpPr>
-      <p:grpSpPr>
-        <a:xfrm>
-          <a:off x="0" y="0"/>
-          <a:ext cx="0" cy="0"/>
-          <a:chOff x="0" y="0"/>
-          <a:chExt cx="0" cy="0"/>
-        </a:xfrm>
-      </p:grpSpPr>
-      <p:sp>
-        <p:nvSpPr>
-          <p:cNvPr id="2" name="Title 1">
-            <a:extLst>
-              <a:ext uri="{FF2B5EF4-FFF2-40B4-BE49-F238E27FC236}">
-                <a16:creationId xmlns:a16="http://schemas.microsoft.com/office/drawing/2014/main" id="{60C13765-EE2E-DEA0-DD24-244D714ACDBE}"/>
-              </a:ext>
-            </a:extLst>
-          </p:cNvPr>
-          <p:cNvSpPr>
-            <a:spLocks noGrp="1"/>
-          </p:cNvSpPr>
-          <p:nvPr>
-            <p:ph type="title"/>
-          </p:nvPr>
-        </p:nvSpPr>
-        <p:spPr/>
-        <p:txBody>
-          <a:bodyPr/>
-          <a:lstStyle/>
-          <a:p>
-            <a:r>
-              <a:rPr lang="en-US" dirty="0"/>
-              <a:t>Data Exploration</a:t>
-            </a:r>
-          </a:p>
-        </p:txBody>
-      </p:sp>
-      <p:sp>
-        <p:nvSpPr>
-          <p:cNvPr id="3" name="Content Placeholder 2">
-            <a:extLst>
-              <a:ext uri="{FF2B5EF4-FFF2-40B4-BE49-F238E27FC236}">
-                <a16:creationId xmlns:a16="http://schemas.microsoft.com/office/drawing/2014/main" id="{5CE8BBE8-0234-681F-E2DB-53675833881A}"/>
-              </a:ext>
-            </a:extLst>
-          </p:cNvPr>
-          <p:cNvSpPr>
-            <a:spLocks noGrp="1"/>
-          </p:cNvSpPr>
-          <p:nvPr>
-            <p:ph idx="1"/>
-          </p:nvPr>
-        </p:nvSpPr>
-        <p:spPr/>
-        <p:txBody>
-          <a:bodyPr/>
-          <a:lstStyle/>
-          <a:p>
-            <a:r>
-              <a:rPr lang="en-US" dirty="0"/>
-              <a:t>35 columns with Biopsy as the </a:t>
-            </a:r>
-            <a:r>
-              <a:rPr lang="en-US"/>
-              <a:t>target column</a:t>
-            </a:r>
-          </a:p>
-          <a:p>
-            <a:endParaRPr lang="en-US"/>
-          </a:p>
-        </p:txBody>
-      </p:sp>
-    </p:spTree>
-    <p:extLst>
-      <p:ext uri="{BB962C8B-B14F-4D97-AF65-F5344CB8AC3E}">
-        <p14:creationId xmlns:p14="http://schemas.microsoft.com/office/powerpoint/2010/main" val="1025123411"/>
-      </p:ext>
-    </p:extLst>
-  </p:cSld>
-  <p:clrMapOvr>
-    <a:masterClrMapping/>
-  </p:clrMapOvr>
-</p:sld>
-</file>
-
-<file path=ppt/slides/slide18.xml><?xml version="1.0" encoding="utf-8"?>
-<p:sld xmlns:a="http://schemas.openxmlformats.org/drawingml/2006/main" xmlns:r="http://schemas.openxmlformats.org/officeDocument/2006/relationships" xmlns:p="http://schemas.openxmlformats.org/presentationml/2006/main">
-  <p:cSld>
-    <p:spTree>
-      <p:nvGrpSpPr>
-        <p:cNvPr id="1" name=""/>
-        <p:cNvGrpSpPr/>
-        <p:nvPr/>
-      </p:nvGrpSpPr>
-      <p:grpSpPr>
-        <a:xfrm>
-          <a:off x="0" y="0"/>
-          <a:ext cx="0" cy="0"/>
-          <a:chOff x="0" y="0"/>
-          <a:chExt cx="0" cy="0"/>
-        </a:xfrm>
-      </p:grpSpPr>
-      <p:sp>
-        <p:nvSpPr>
-          <p:cNvPr id="2" name="Title 1">
-            <a:extLst>
-              <a:ext uri="{FF2B5EF4-FFF2-40B4-BE49-F238E27FC236}">
-                <a16:creationId xmlns:a16="http://schemas.microsoft.com/office/drawing/2014/main" id="{B39FA4A9-F560-95AC-6319-806FB6F081DA}"/>
-              </a:ext>
-            </a:extLst>
-          </p:cNvPr>
-          <p:cNvSpPr>
-            <a:spLocks noGrp="1"/>
-          </p:cNvSpPr>
-          <p:nvPr>
-            <p:ph type="title"/>
-          </p:nvPr>
-        </p:nvSpPr>
-        <p:spPr/>
-        <p:txBody>
-          <a:bodyPr/>
-          <a:lstStyle/>
-          <a:p>
-            <a:endParaRPr lang="en-US"/>
-          </a:p>
-        </p:txBody>
-      </p:sp>
-      <p:sp>
-        <p:nvSpPr>
-          <p:cNvPr id="3" name="Content Placeholder 2">
-            <a:extLst>
-              <a:ext uri="{FF2B5EF4-FFF2-40B4-BE49-F238E27FC236}">
-                <a16:creationId xmlns:a16="http://schemas.microsoft.com/office/drawing/2014/main" id="{5EFFC053-6AC2-C4C4-5C02-1868B5975271}"/>
-              </a:ext>
-            </a:extLst>
-          </p:cNvPr>
-          <p:cNvSpPr>
-            <a:spLocks noGrp="1"/>
-          </p:cNvSpPr>
-          <p:nvPr>
-            <p:ph idx="1"/>
-          </p:nvPr>
-        </p:nvSpPr>
-        <p:spPr/>
-        <p:txBody>
-          <a:bodyPr/>
-          <a:lstStyle/>
-          <a:p>
-            <a:r>
-              <a:rPr lang="en-US" dirty="0" err="1"/>
-              <a:t>SparkML</a:t>
-            </a:r>
-            <a:r>
-              <a:rPr lang="en-US" dirty="0"/>
-              <a:t> and Spark</a:t>
-            </a:r>
-          </a:p>
-          <a:p>
-            <a:r>
-              <a:rPr lang="en-US" dirty="0"/>
-              <a:t>Application of Spark and </a:t>
-            </a:r>
-            <a:r>
-              <a:rPr lang="en-US" dirty="0" err="1"/>
-              <a:t>SparkML</a:t>
-            </a:r>
-            <a:r>
-              <a:rPr lang="en-US" dirty="0"/>
-              <a:t> </a:t>
-            </a:r>
-          </a:p>
-          <a:p>
-            <a:r>
-              <a:rPr lang="en-US" dirty="0"/>
-              <a:t>Performance metric</a:t>
-            </a:r>
-          </a:p>
-          <a:p>
-            <a:pPr lvl="1"/>
-            <a:r>
-              <a:rPr lang="en-US" dirty="0"/>
-              <a:t>Accuracy (Done a lot before)</a:t>
-            </a:r>
-          </a:p>
-          <a:p>
-            <a:pPr lvl="1"/>
-            <a:r>
-              <a:rPr lang="en-US" dirty="0"/>
-              <a:t>Scalability  (Big data – similar parallel project)</a:t>
-            </a:r>
-          </a:p>
-          <a:p>
-            <a:pPr lvl="1"/>
-            <a:r>
-              <a:rPr lang="en-US" dirty="0"/>
-              <a:t>Code Portability (GOOGLE –CLOUD –compared code modification …. – how easy to scale)</a:t>
-            </a:r>
-          </a:p>
-          <a:p>
-            <a:endParaRPr lang="en-US" dirty="0"/>
-          </a:p>
-        </p:txBody>
-      </p:sp>
-    </p:spTree>
-    <p:extLst>
-      <p:ext uri="{BB962C8B-B14F-4D97-AF65-F5344CB8AC3E}">
-        <p14:creationId xmlns:p14="http://schemas.microsoft.com/office/powerpoint/2010/main" val="508714902"/>
-      </p:ext>
-    </p:extLst>
-  </p:cSld>
-  <p:clrMapOvr>
-    <a:masterClrMapping/>
-  </p:clrMapOvr>
-</p:sld>
-</file>
-
 <file path=ppt/slides/slide19.xml><?xml version="1.0" encoding="utf-8"?>
 <p:sld xmlns:a="http://schemas.openxmlformats.org/drawingml/2006/main" xmlns:r="http://schemas.openxmlformats.org/officeDocument/2006/relationships" xmlns:p="http://schemas.openxmlformats.org/presentationml/2006/main">
   <p:cSld>
@@ -4936,7 +4978,7 @@
           <p:cNvPr id="2" name="Title 1">
             <a:extLst>
               <a:ext uri="{FF2B5EF4-FFF2-40B4-BE49-F238E27FC236}">
-                <a16:creationId xmlns:a16="http://schemas.microsoft.com/office/drawing/2014/main" id="{B5288F8A-991E-84A1-5B47-44A8E9AB8DAD}"/>
+                <a16:creationId xmlns:a16="http://schemas.microsoft.com/office/drawing/2014/main" id="{60C13765-EE2E-DEA0-DD24-244D714ACDBE}"/>
               </a:ext>
             </a:extLst>
           </p:cNvPr>
@@ -4954,7 +4996,7 @@
           <a:p>
             <a:r>
               <a:rPr lang="en-US" dirty="0"/>
-              <a:t>2 week goal</a:t>
+              <a:t>Data Exploration</a:t>
             </a:r>
           </a:p>
         </p:txBody>
@@ -4964,7 +5006,7 @@
           <p:cNvPr id="3" name="Content Placeholder 2">
             <a:extLst>
               <a:ext uri="{FF2B5EF4-FFF2-40B4-BE49-F238E27FC236}">
-                <a16:creationId xmlns:a16="http://schemas.microsoft.com/office/drawing/2014/main" id="{BD442E65-C1BD-F4C8-5A08-894DC42071D7}"/>
+                <a16:creationId xmlns:a16="http://schemas.microsoft.com/office/drawing/2014/main" id="{5CE8BBE8-0234-681F-E2DB-53675833881A}"/>
               </a:ext>
             </a:extLst>
           </p:cNvPr>
@@ -4982,50 +5024,22 @@
           <a:p>
             <a:r>
               <a:rPr lang="en-US" dirty="0"/>
-              <a:t>Looking at how to test code portability in a scientific manner</a:t>
-            </a:r>
-          </a:p>
-          <a:p>
-            <a:r>
-              <a:rPr lang="en-US" dirty="0"/>
-              <a:t>Run this thing on </a:t>
-            </a:r>
-            <a:r>
-              <a:rPr lang="en-US" dirty="0" err="1"/>
-              <a:t>GCLoud</a:t>
-            </a:r>
-            <a:endParaRPr lang="en-US" dirty="0"/>
-          </a:p>
-          <a:p>
-            <a:r>
-              <a:rPr lang="en-US" dirty="0"/>
-              <a:t>Spark Pipeline - </a:t>
-            </a:r>
-            <a:r>
-              <a:rPr lang="en-US" dirty="0" err="1"/>
-              <a:t>SLides</a:t>
-            </a:r>
-            <a:endParaRPr lang="en-US" dirty="0"/>
-          </a:p>
-          <a:p>
-            <a:r>
-              <a:rPr lang="en-US" dirty="0"/>
-              <a:t>Focus on algorithm, mathematical details – May be try to look at LDA. </a:t>
-            </a:r>
-          </a:p>
-          <a:p>
-            <a:pPr lvl="1"/>
-            <a:r>
-              <a:rPr lang="en-US" dirty="0"/>
-              <a:t>Spark Statistic Parameter</a:t>
-            </a:r>
+              <a:t>35 columns with Biopsy as the </a:t>
+            </a:r>
+            <a:r>
+              <a:rPr lang="en-US"/>
+              <a:t>target column</a:t>
+            </a:r>
+          </a:p>
+          <a:p>
+            <a:endParaRPr lang="en-US"/>
           </a:p>
         </p:txBody>
       </p:sp>
     </p:spTree>
     <p:extLst>
       <p:ext uri="{BB962C8B-B14F-4D97-AF65-F5344CB8AC3E}">
-        <p14:creationId xmlns:p14="http://schemas.microsoft.com/office/powerpoint/2010/main" val="1595575665"/>
+        <p14:creationId xmlns:p14="http://schemas.microsoft.com/office/powerpoint/2010/main" val="1025123411"/>
       </p:ext>
     </p:extLst>
   </p:cSld>
@@ -5142,6 +5156,258 @@
     <p:extLst>
       <p:ext uri="{BB962C8B-B14F-4D97-AF65-F5344CB8AC3E}">
         <p14:creationId xmlns:p14="http://schemas.microsoft.com/office/powerpoint/2010/main" val="1149519865"/>
+      </p:ext>
+    </p:extLst>
+  </p:cSld>
+  <p:clrMapOvr>
+    <a:masterClrMapping/>
+  </p:clrMapOvr>
+</p:sld>
+</file>
+
+<file path=ppt/slides/slide20.xml><?xml version="1.0" encoding="utf-8"?>
+<p:sld xmlns:a="http://schemas.openxmlformats.org/drawingml/2006/main" xmlns:r="http://schemas.openxmlformats.org/officeDocument/2006/relationships" xmlns:p="http://schemas.openxmlformats.org/presentationml/2006/main">
+  <p:cSld>
+    <p:spTree>
+      <p:nvGrpSpPr>
+        <p:cNvPr id="1" name=""/>
+        <p:cNvGrpSpPr/>
+        <p:nvPr/>
+      </p:nvGrpSpPr>
+      <p:grpSpPr>
+        <a:xfrm>
+          <a:off x="0" y="0"/>
+          <a:ext cx="0" cy="0"/>
+          <a:chOff x="0" y="0"/>
+          <a:chExt cx="0" cy="0"/>
+        </a:xfrm>
+      </p:grpSpPr>
+      <p:sp>
+        <p:nvSpPr>
+          <p:cNvPr id="2" name="Title 1">
+            <a:extLst>
+              <a:ext uri="{FF2B5EF4-FFF2-40B4-BE49-F238E27FC236}">
+                <a16:creationId xmlns:a16="http://schemas.microsoft.com/office/drawing/2014/main" id="{B39FA4A9-F560-95AC-6319-806FB6F081DA}"/>
+              </a:ext>
+            </a:extLst>
+          </p:cNvPr>
+          <p:cNvSpPr>
+            <a:spLocks noGrp="1"/>
+          </p:cNvSpPr>
+          <p:nvPr>
+            <p:ph type="title"/>
+          </p:nvPr>
+        </p:nvSpPr>
+        <p:spPr/>
+        <p:txBody>
+          <a:bodyPr/>
+          <a:lstStyle/>
+          <a:p>
+            <a:endParaRPr lang="en-US"/>
+          </a:p>
+        </p:txBody>
+      </p:sp>
+      <p:sp>
+        <p:nvSpPr>
+          <p:cNvPr id="3" name="Content Placeholder 2">
+            <a:extLst>
+              <a:ext uri="{FF2B5EF4-FFF2-40B4-BE49-F238E27FC236}">
+                <a16:creationId xmlns:a16="http://schemas.microsoft.com/office/drawing/2014/main" id="{5EFFC053-6AC2-C4C4-5C02-1868B5975271}"/>
+              </a:ext>
+            </a:extLst>
+          </p:cNvPr>
+          <p:cNvSpPr>
+            <a:spLocks noGrp="1"/>
+          </p:cNvSpPr>
+          <p:nvPr>
+            <p:ph idx="1"/>
+          </p:nvPr>
+        </p:nvSpPr>
+        <p:spPr/>
+        <p:txBody>
+          <a:bodyPr/>
+          <a:lstStyle/>
+          <a:p>
+            <a:r>
+              <a:rPr lang="en-US" dirty="0" err="1"/>
+              <a:t>SparkML</a:t>
+            </a:r>
+            <a:r>
+              <a:rPr lang="en-US" dirty="0"/>
+              <a:t> and Spark</a:t>
+            </a:r>
+          </a:p>
+          <a:p>
+            <a:r>
+              <a:rPr lang="en-US" dirty="0"/>
+              <a:t>Application of Spark and </a:t>
+            </a:r>
+            <a:r>
+              <a:rPr lang="en-US" dirty="0" err="1"/>
+              <a:t>SparkML</a:t>
+            </a:r>
+            <a:r>
+              <a:rPr lang="en-US" dirty="0"/>
+              <a:t> </a:t>
+            </a:r>
+          </a:p>
+          <a:p>
+            <a:r>
+              <a:rPr lang="en-US" dirty="0"/>
+              <a:t>Performance metric</a:t>
+            </a:r>
+          </a:p>
+          <a:p>
+            <a:pPr lvl="1"/>
+            <a:r>
+              <a:rPr lang="en-US" dirty="0"/>
+              <a:t>Accuracy (Done a lot before)</a:t>
+            </a:r>
+          </a:p>
+          <a:p>
+            <a:pPr lvl="1"/>
+            <a:r>
+              <a:rPr lang="en-US" dirty="0"/>
+              <a:t>Scalability  (Big data – similar parallel project)</a:t>
+            </a:r>
+          </a:p>
+          <a:p>
+            <a:pPr lvl="1"/>
+            <a:r>
+              <a:rPr lang="en-US" dirty="0"/>
+              <a:t>Code Portability (GOOGLE –CLOUD –compared code modification …. – how easy to scale)</a:t>
+            </a:r>
+          </a:p>
+          <a:p>
+            <a:endParaRPr lang="en-US" dirty="0"/>
+          </a:p>
+        </p:txBody>
+      </p:sp>
+    </p:spTree>
+    <p:extLst>
+      <p:ext uri="{BB962C8B-B14F-4D97-AF65-F5344CB8AC3E}">
+        <p14:creationId xmlns:p14="http://schemas.microsoft.com/office/powerpoint/2010/main" val="508714902"/>
+      </p:ext>
+    </p:extLst>
+  </p:cSld>
+  <p:clrMapOvr>
+    <a:masterClrMapping/>
+  </p:clrMapOvr>
+</p:sld>
+</file>
+
+<file path=ppt/slides/slide21.xml><?xml version="1.0" encoding="utf-8"?>
+<p:sld xmlns:a="http://schemas.openxmlformats.org/drawingml/2006/main" xmlns:r="http://schemas.openxmlformats.org/officeDocument/2006/relationships" xmlns:p="http://schemas.openxmlformats.org/presentationml/2006/main">
+  <p:cSld>
+    <p:spTree>
+      <p:nvGrpSpPr>
+        <p:cNvPr id="1" name=""/>
+        <p:cNvGrpSpPr/>
+        <p:nvPr/>
+      </p:nvGrpSpPr>
+      <p:grpSpPr>
+        <a:xfrm>
+          <a:off x="0" y="0"/>
+          <a:ext cx="0" cy="0"/>
+          <a:chOff x="0" y="0"/>
+          <a:chExt cx="0" cy="0"/>
+        </a:xfrm>
+      </p:grpSpPr>
+      <p:sp>
+        <p:nvSpPr>
+          <p:cNvPr id="2" name="Title 1">
+            <a:extLst>
+              <a:ext uri="{FF2B5EF4-FFF2-40B4-BE49-F238E27FC236}">
+                <a16:creationId xmlns:a16="http://schemas.microsoft.com/office/drawing/2014/main" id="{B5288F8A-991E-84A1-5B47-44A8E9AB8DAD}"/>
+              </a:ext>
+            </a:extLst>
+          </p:cNvPr>
+          <p:cNvSpPr>
+            <a:spLocks noGrp="1"/>
+          </p:cNvSpPr>
+          <p:nvPr>
+            <p:ph type="title"/>
+          </p:nvPr>
+        </p:nvSpPr>
+        <p:spPr/>
+        <p:txBody>
+          <a:bodyPr/>
+          <a:lstStyle/>
+          <a:p>
+            <a:r>
+              <a:rPr lang="en-US" dirty="0"/>
+              <a:t>2 week goal</a:t>
+            </a:r>
+          </a:p>
+        </p:txBody>
+      </p:sp>
+      <p:sp>
+        <p:nvSpPr>
+          <p:cNvPr id="3" name="Content Placeholder 2">
+            <a:extLst>
+              <a:ext uri="{FF2B5EF4-FFF2-40B4-BE49-F238E27FC236}">
+                <a16:creationId xmlns:a16="http://schemas.microsoft.com/office/drawing/2014/main" id="{BD442E65-C1BD-F4C8-5A08-894DC42071D7}"/>
+              </a:ext>
+            </a:extLst>
+          </p:cNvPr>
+          <p:cNvSpPr>
+            <a:spLocks noGrp="1"/>
+          </p:cNvSpPr>
+          <p:nvPr>
+            <p:ph idx="1"/>
+          </p:nvPr>
+        </p:nvSpPr>
+        <p:spPr/>
+        <p:txBody>
+          <a:bodyPr/>
+          <a:lstStyle/>
+          <a:p>
+            <a:r>
+              <a:rPr lang="en-US" dirty="0"/>
+              <a:t>Looking at how to test code portability in a scientific manner</a:t>
+            </a:r>
+          </a:p>
+          <a:p>
+            <a:r>
+              <a:rPr lang="en-US" dirty="0"/>
+              <a:t>Run this thing on </a:t>
+            </a:r>
+            <a:r>
+              <a:rPr lang="en-US" dirty="0" err="1"/>
+              <a:t>GCLoud</a:t>
+            </a:r>
+            <a:endParaRPr lang="en-US" dirty="0"/>
+          </a:p>
+          <a:p>
+            <a:r>
+              <a:rPr lang="en-US" dirty="0"/>
+              <a:t>Spark Pipeline - </a:t>
+            </a:r>
+            <a:r>
+              <a:rPr lang="en-US" dirty="0" err="1"/>
+              <a:t>SLides</a:t>
+            </a:r>
+            <a:endParaRPr lang="en-US" dirty="0"/>
+          </a:p>
+          <a:p>
+            <a:r>
+              <a:rPr lang="en-US" dirty="0"/>
+              <a:t>Focus on algorithm, mathematical details – May be try to look at LDA. </a:t>
+            </a:r>
+          </a:p>
+          <a:p>
+            <a:pPr lvl="1"/>
+            <a:r>
+              <a:rPr lang="en-US" dirty="0"/>
+              <a:t>Spark Statistic Parameter</a:t>
+            </a:r>
+          </a:p>
+        </p:txBody>
+      </p:sp>
+    </p:spTree>
+    <p:extLst>
+      <p:ext uri="{BB962C8B-B14F-4D97-AF65-F5344CB8AC3E}">
+        <p14:creationId xmlns:p14="http://schemas.microsoft.com/office/powerpoint/2010/main" val="1595575665"/>
       </p:ext>
     </p:extLst>
   </p:cSld>
@@ -5475,7 +5741,7 @@
           <p:cNvPr id="2" name="Title 1">
             <a:extLst>
               <a:ext uri="{FF2B5EF4-FFF2-40B4-BE49-F238E27FC236}">
-                <a16:creationId xmlns:a16="http://schemas.microsoft.com/office/drawing/2014/main" id="{699F9459-1267-822B-CD73-2C4B4B2B3746}"/>
+                <a16:creationId xmlns:a16="http://schemas.microsoft.com/office/drawing/2014/main" id="{BAC81341-8D01-C641-235B-253B37460D4F}"/>
               </a:ext>
             </a:extLst>
           </p:cNvPr>
@@ -5493,8 +5759,9 @@
           <a:p>
             <a:r>
               <a:rPr lang="en-US" dirty="0"/>
-              <a:t>What is Spark and Spark ML</a:t>
-            </a:r>
+              <a:t>Map Reduce</a:t>
+            </a:r>
+            <a:endParaRPr lang="en-GB" dirty="0"/>
           </a:p>
         </p:txBody>
       </p:sp>
@@ -5503,7 +5770,7 @@
           <p:cNvPr id="3" name="Content Placeholder 2">
             <a:extLst>
               <a:ext uri="{FF2B5EF4-FFF2-40B4-BE49-F238E27FC236}">
-                <a16:creationId xmlns:a16="http://schemas.microsoft.com/office/drawing/2014/main" id="{E028B0F8-FBD8-E33A-D11F-4E4DC56A466D}"/>
+                <a16:creationId xmlns:a16="http://schemas.microsoft.com/office/drawing/2014/main" id="{632A5107-645C-8386-D666-792BE5BE7E9A}"/>
               </a:ext>
             </a:extLst>
           </p:cNvPr>
@@ -5516,62 +5783,157 @@
         </p:nvSpPr>
         <p:spPr/>
         <p:txBody>
-          <a:bodyPr/>
-          <a:lstStyle/>
-          <a:p>
-            <a:r>
-              <a:rPr lang="en-US" dirty="0"/>
-              <a:t>Spark:</a:t>
-            </a:r>
-          </a:p>
-          <a:p>
-            <a:pPr lvl="1"/>
-            <a:r>
-              <a:rPr lang="en-US" dirty="0"/>
-              <a:t>Distributed computing/big data platform by Apache</a:t>
-            </a:r>
-          </a:p>
-          <a:p>
-            <a:pPr lvl="1"/>
-            <a:r>
-              <a:rPr lang="en-US" dirty="0"/>
-              <a:t>High speed processing and efficient handling of data</a:t>
-            </a:r>
-          </a:p>
-          <a:p>
-            <a:r>
-              <a:rPr lang="en-US" dirty="0" err="1"/>
-              <a:t>SparkML</a:t>
-            </a:r>
-            <a:endParaRPr lang="en-US" dirty="0"/>
-          </a:p>
-          <a:p>
-            <a:pPr lvl="1"/>
-            <a:r>
-              <a:rPr lang="en-US" dirty="0"/>
-              <a:t>Library that is included in Apache spark</a:t>
-            </a:r>
-          </a:p>
-          <a:p>
-            <a:pPr lvl="1"/>
-            <a:r>
-              <a:rPr lang="en-US" dirty="0"/>
-              <a:t>Distributed prebuilt implementation of some common machine algorithm</a:t>
-            </a:r>
-          </a:p>
-          <a:p>
-            <a:pPr lvl="1"/>
-            <a:r>
-              <a:rPr lang="en-US" dirty="0"/>
-              <a:t>Pipeline API can simplify the building, training and deployment process of machine learning models.</a:t>
-            </a:r>
-          </a:p>
-        </p:txBody>
-      </p:sp>
+          <a:bodyPr>
+            <a:normAutofit/>
+          </a:bodyPr>
+          <a:lstStyle/>
+          <a:p>
+            <a:r>
+              <a:rPr lang="en-GB" b="0" i="0" dirty="0">
+                <a:solidFill>
+                  <a:srgbClr val="374151"/>
+                </a:solidFill>
+                <a:effectLst/>
+                <a:latin typeface="Söhne"/>
+              </a:rPr>
+              <a:t>MapReduce: programming framework introduce by google to handle large datasets, cluster processing</a:t>
+            </a:r>
+          </a:p>
+          <a:p>
+            <a:r>
+              <a:rPr lang="en-GB" b="0" i="0" dirty="0">
+                <a:solidFill>
+                  <a:srgbClr val="374151"/>
+                </a:solidFill>
+                <a:effectLst/>
+                <a:latin typeface="Söhne"/>
+              </a:rPr>
+              <a:t>Workflow: input divided, independent processing, result combination</a:t>
+            </a:r>
+          </a:p>
+          <a:p>
+            <a:pPr algn="l">
+              <a:buFont typeface="Arial" panose="020B0604020202020204" pitchFamily="34" charset="0"/>
+              <a:buChar char="•"/>
+            </a:pPr>
+            <a:r>
+              <a:rPr lang="en-GB" b="0" i="0" dirty="0">
+                <a:solidFill>
+                  <a:srgbClr val="374151"/>
+                </a:solidFill>
+                <a:effectLst/>
+                <a:latin typeface="Söhne"/>
+              </a:rPr>
+              <a:t>Procedures: map (</a:t>
+            </a:r>
+            <a:r>
+              <a:rPr lang="en-GB" b="0" i="0" dirty="0" err="1">
+                <a:solidFill>
+                  <a:srgbClr val="374151"/>
+                </a:solidFill>
+                <a:effectLst/>
+                <a:latin typeface="Söhne"/>
+              </a:rPr>
+              <a:t>preprocessing</a:t>
+            </a:r>
+            <a:r>
+              <a:rPr lang="en-GB" b="0" i="0" dirty="0">
+                <a:solidFill>
+                  <a:srgbClr val="374151"/>
+                </a:solidFill>
+                <a:effectLst/>
+                <a:latin typeface="Söhne"/>
+              </a:rPr>
+              <a:t>), reduce (aggregation)</a:t>
+            </a:r>
+          </a:p>
+          <a:p>
+            <a:pPr algn="l">
+              <a:buFont typeface="Arial" panose="020B0604020202020204" pitchFamily="34" charset="0"/>
+              <a:buChar char="•"/>
+            </a:pPr>
+            <a:r>
+              <a:rPr lang="en-GB" b="0" i="0" dirty="0">
+                <a:solidFill>
+                  <a:srgbClr val="374151"/>
+                </a:solidFill>
+                <a:effectLst/>
+                <a:latin typeface="Söhne"/>
+              </a:rPr>
+              <a:t>Hadoop MapReduce: popular implementation</a:t>
+            </a:r>
+          </a:p>
+          <a:p>
+            <a:pPr algn="l">
+              <a:buFont typeface="Arial" panose="020B0604020202020204" pitchFamily="34" charset="0"/>
+              <a:buChar char="•"/>
+            </a:pPr>
+            <a:r>
+              <a:rPr lang="en-GB" b="0" i="0" dirty="0">
+                <a:solidFill>
+                  <a:srgbClr val="374151"/>
+                </a:solidFill>
+                <a:effectLst/>
+                <a:latin typeface="Söhne"/>
+              </a:rPr>
+              <a:t>Scalable, fault-tolerant</a:t>
+            </a:r>
+          </a:p>
+          <a:p>
+            <a:pPr algn="l">
+              <a:buFont typeface="Arial" panose="020B0604020202020204" pitchFamily="34" charset="0"/>
+              <a:buChar char="•"/>
+            </a:pPr>
+            <a:r>
+              <a:rPr lang="en-GB" b="0" i="0" dirty="0">
+                <a:solidFill>
+                  <a:srgbClr val="374151"/>
+                </a:solidFill>
+                <a:effectLst/>
+                <a:latin typeface="Söhne"/>
+              </a:rPr>
+              <a:t>Used for batch processing, offline data jobs</a:t>
+            </a:r>
+          </a:p>
+          <a:p>
+            <a:endParaRPr lang="en-GB" dirty="0"/>
+          </a:p>
+        </p:txBody>
+      </p:sp>
+      <p:pic>
+        <p:nvPicPr>
+          <p:cNvPr id="7" name="Picture 6">
+            <a:extLst>
+              <a:ext uri="{FF2B5EF4-FFF2-40B4-BE49-F238E27FC236}">
+                <a16:creationId xmlns:a16="http://schemas.microsoft.com/office/drawing/2014/main" id="{3D99E3C4-F521-A694-9CA8-A47057BEA308}"/>
+              </a:ext>
+            </a:extLst>
+          </p:cNvPr>
+          <p:cNvPicPr>
+            <a:picLocks noChangeAspect="1"/>
+          </p:cNvPicPr>
+          <p:nvPr/>
+        </p:nvPicPr>
+        <p:blipFill>
+          <a:blip r:embed="rId2"/>
+          <a:stretch>
+            <a:fillRect/>
+          </a:stretch>
+        </p:blipFill>
+        <p:spPr>
+          <a:xfrm>
+            <a:off x="4146108" y="336181"/>
+            <a:ext cx="3899783" cy="1332310"/>
+          </a:xfrm>
+          <a:prstGeom prst="rect">
+            <a:avLst/>
+          </a:prstGeom>
+        </p:spPr>
+      </p:pic>
     </p:spTree>
     <p:extLst>
       <p:ext uri="{BB962C8B-B14F-4D97-AF65-F5344CB8AC3E}">
-        <p14:creationId xmlns:p14="http://schemas.microsoft.com/office/powerpoint/2010/main" val="566999406"/>
+        <p14:creationId xmlns:p14="http://schemas.microsoft.com/office/powerpoint/2010/main" val="2685537084"/>
       </p:ext>
     </p:extLst>
   </p:cSld>
@@ -5603,7 +5965,7 @@
           <p:cNvPr id="2" name="Title 1">
             <a:extLst>
               <a:ext uri="{FF2B5EF4-FFF2-40B4-BE49-F238E27FC236}">
-                <a16:creationId xmlns:a16="http://schemas.microsoft.com/office/drawing/2014/main" id="{D69A6712-3ED2-7C60-EFB7-00DF1E71EB5D}"/>
+                <a16:creationId xmlns:a16="http://schemas.microsoft.com/office/drawing/2014/main" id="{699F9459-1267-822B-CD73-2C4B4B2B3746}"/>
               </a:ext>
             </a:extLst>
           </p:cNvPr>
@@ -5621,7 +5983,7 @@
           <a:p>
             <a:r>
               <a:rPr lang="en-US" dirty="0"/>
-              <a:t>Spark - Logo addition</a:t>
+              <a:t>What is Spark and Spark ML</a:t>
             </a:r>
           </a:p>
         </p:txBody>
@@ -5631,7 +5993,7 @@
           <p:cNvPr id="3" name="Content Placeholder 2">
             <a:extLst>
               <a:ext uri="{FF2B5EF4-FFF2-40B4-BE49-F238E27FC236}">
-                <a16:creationId xmlns:a16="http://schemas.microsoft.com/office/drawing/2014/main" id="{46773400-6A10-092D-A147-2A1BB8C6A87A}"/>
+                <a16:creationId xmlns:a16="http://schemas.microsoft.com/office/drawing/2014/main" id="{E028B0F8-FBD8-E33A-D11F-4E4DC56A466D}"/>
               </a:ext>
             </a:extLst>
           </p:cNvPr>
@@ -5644,17 +6006,143 @@
         </p:nvSpPr>
         <p:spPr/>
         <p:txBody>
-          <a:bodyPr/>
-          <a:lstStyle/>
-          <a:p>
-            <a:endParaRPr lang="en-US"/>
-          </a:p>
-        </p:txBody>
-      </p:sp>
+          <a:bodyPr>
+            <a:noAutofit/>
+          </a:bodyPr>
+          <a:lstStyle/>
+          <a:p>
+            <a:r>
+              <a:rPr lang="en-US" dirty="0"/>
+              <a:t>Spark:</a:t>
+            </a:r>
+          </a:p>
+          <a:p>
+            <a:pPr lvl="1"/>
+            <a:r>
+              <a:rPr lang="en-GB" sz="2000" b="0" i="0" dirty="0">
+                <a:solidFill>
+                  <a:srgbClr val="374151"/>
+                </a:solidFill>
+                <a:effectLst/>
+                <a:latin typeface="Söhne"/>
+              </a:rPr>
+              <a:t>Apache Spark: introduced in 2014 at UC Berkeley</a:t>
+            </a:r>
+          </a:p>
+          <a:p>
+            <a:pPr lvl="1"/>
+            <a:r>
+              <a:rPr lang="en-GB" sz="2000" dirty="0">
+                <a:solidFill>
+                  <a:srgbClr val="374151"/>
+                </a:solidFill>
+                <a:latin typeface="Söhne"/>
+              </a:rPr>
+              <a:t>Goal:</a:t>
+            </a:r>
+            <a:r>
+              <a:rPr lang="en-GB" sz="2000" b="0" i="0" dirty="0">
+                <a:solidFill>
+                  <a:srgbClr val="374151"/>
+                </a:solidFill>
+                <a:effectLst/>
+                <a:latin typeface="Söhne"/>
+              </a:rPr>
+              <a:t> addresses limitations of other Big Data frameworks</a:t>
+            </a:r>
+          </a:p>
+          <a:p>
+            <a:pPr lvl="1"/>
+            <a:r>
+              <a:rPr lang="en-GB" sz="2000" b="0" i="0" dirty="0">
+                <a:solidFill>
+                  <a:srgbClr val="374151"/>
+                </a:solidFill>
+                <a:effectLst/>
+                <a:latin typeface="Söhne"/>
+              </a:rPr>
+              <a:t>Spark expands on MapReduce, adds features and optimizations</a:t>
+            </a:r>
+          </a:p>
+          <a:p>
+            <a:pPr lvl="2"/>
+            <a:r>
+              <a:rPr lang="en-GB" sz="2000" b="0" i="0" dirty="0">
+                <a:solidFill>
+                  <a:srgbClr val="374151"/>
+                </a:solidFill>
+                <a:effectLst/>
+                <a:latin typeface="Söhne"/>
+              </a:rPr>
+              <a:t>In-memory caching boosts performance compared to disk-based MapReduce</a:t>
+            </a:r>
+          </a:p>
+          <a:p>
+            <a:pPr lvl="2"/>
+            <a:r>
+              <a:rPr lang="en-GB" sz="2000" b="0" i="0" dirty="0">
+                <a:solidFill>
+                  <a:srgbClr val="374151"/>
+                </a:solidFill>
+                <a:effectLst/>
+                <a:latin typeface="Söhne"/>
+              </a:rPr>
+              <a:t>Supports integration with other languages and platforms</a:t>
+            </a:r>
+          </a:p>
+          <a:p>
+            <a:pPr lvl="2"/>
+            <a:r>
+              <a:rPr lang="en-GB" sz="2000" b="0" i="0" dirty="0">
+                <a:solidFill>
+                  <a:srgbClr val="374151"/>
+                </a:solidFill>
+                <a:effectLst/>
+                <a:latin typeface="Söhne"/>
+              </a:rPr>
+              <a:t>Higher-level API and expressive programming models in Spark lower the barrier of entry compared to MapReduce</a:t>
+            </a:r>
+            <a:endParaRPr lang="en-US" sz="2000" dirty="0"/>
+          </a:p>
+          <a:p>
+            <a:endParaRPr lang="en-US" dirty="0"/>
+          </a:p>
+        </p:txBody>
+      </p:sp>
+      <p:pic>
+        <p:nvPicPr>
+          <p:cNvPr id="5" name="Picture 4">
+            <a:extLst>
+              <a:ext uri="{FF2B5EF4-FFF2-40B4-BE49-F238E27FC236}">
+                <a16:creationId xmlns:a16="http://schemas.microsoft.com/office/drawing/2014/main" id="{C4BA642F-DFC8-9DDC-464E-4DF025F2B434}"/>
+              </a:ext>
+            </a:extLst>
+          </p:cNvPr>
+          <p:cNvPicPr>
+            <a:picLocks noChangeAspect="1"/>
+          </p:cNvPicPr>
+          <p:nvPr/>
+        </p:nvPicPr>
+        <p:blipFill>
+          <a:blip r:embed="rId2"/>
+          <a:stretch>
+            <a:fillRect/>
+          </a:stretch>
+        </p:blipFill>
+        <p:spPr>
+          <a:xfrm>
+            <a:off x="8202485" y="432219"/>
+            <a:ext cx="3611859" cy="2843070"/>
+          </a:xfrm>
+          <a:prstGeom prst="rect">
+            <a:avLst/>
+          </a:prstGeom>
+        </p:spPr>
+      </p:pic>
     </p:spTree>
     <p:extLst>
       <p:ext uri="{BB962C8B-B14F-4D97-AF65-F5344CB8AC3E}">
-        <p14:creationId xmlns:p14="http://schemas.microsoft.com/office/powerpoint/2010/main" val="1941543575"/>
+        <p14:creationId xmlns:p14="http://schemas.microsoft.com/office/powerpoint/2010/main" val="566999406"/>
       </p:ext>
     </p:extLst>
   </p:cSld>
@@ -5686,7 +6174,7 @@
           <p:cNvPr id="2" name="Title 1">
             <a:extLst>
               <a:ext uri="{FF2B5EF4-FFF2-40B4-BE49-F238E27FC236}">
-                <a16:creationId xmlns:a16="http://schemas.microsoft.com/office/drawing/2014/main" id="{17CB2D62-82EA-3B8E-30FF-85AF5991998D}"/>
+                <a16:creationId xmlns:a16="http://schemas.microsoft.com/office/drawing/2014/main" id="{FD57D1EF-0706-0636-4038-47DD2681432D}"/>
               </a:ext>
             </a:extLst>
           </p:cNvPr>
@@ -5704,13 +6192,9 @@
           <a:p>
             <a:r>
               <a:rPr lang="en-US" dirty="0"/>
-              <a:t>Why Spark and </a:t>
-            </a:r>
-            <a:r>
-              <a:rPr lang="en-US" dirty="0" err="1"/>
-              <a:t>SparkML</a:t>
-            </a:r>
-            <a:endParaRPr lang="en-US" dirty="0"/>
+              <a:t>What is Spark and Spark ML</a:t>
+            </a:r>
+            <a:endParaRPr lang="en-GB" dirty="0"/>
           </a:p>
         </p:txBody>
       </p:sp>
@@ -5719,7 +6203,7 @@
           <p:cNvPr id="3" name="Content Placeholder 2">
             <a:extLst>
               <a:ext uri="{FF2B5EF4-FFF2-40B4-BE49-F238E27FC236}">
-                <a16:creationId xmlns:a16="http://schemas.microsoft.com/office/drawing/2014/main" id="{C06DFFED-748B-E3F7-12C8-054BEB602AF9}"/>
+                <a16:creationId xmlns:a16="http://schemas.microsoft.com/office/drawing/2014/main" id="{BE5C4CFC-965D-B230-3354-0C89BFAF795D}"/>
               </a:ext>
             </a:extLst>
           </p:cNvPr>
@@ -5732,39 +6216,90 @@
         </p:nvSpPr>
         <p:spPr/>
         <p:txBody>
-          <a:bodyPr/>
-          <a:lstStyle/>
-          <a:p>
-            <a:r>
-              <a:rPr lang="en-US" dirty="0"/>
-              <a:t>Spark and Spark ML perform better for bigger dataset compared to traditional model library such as </a:t>
-            </a:r>
+          <a:bodyPr>
+            <a:normAutofit/>
+          </a:bodyPr>
+          <a:lstStyle/>
+          <a:p>
             <a:r>
               <a:rPr lang="en-US" dirty="0" err="1"/>
-              <a:t>SkLearn</a:t>
+              <a:t>SparkML</a:t>
             </a:r>
             <a:endParaRPr lang="en-US" dirty="0"/>
           </a:p>
           <a:p>
-            <a:r>
-              <a:rPr lang="en-US" dirty="0"/>
-              <a:t>Good integration with Google Cloud</a:t>
-            </a:r>
-          </a:p>
-          <a:p>
-            <a:r>
-              <a:rPr lang="en-US" dirty="0"/>
-              <a:t>Easy scalability: modifying the numbers of workers is 1 line of code</a:t>
-            </a:r>
+            <a:pPr lvl="1"/>
+            <a:r>
+              <a:rPr lang="en-GB" sz="2000" b="0" i="0" dirty="0" err="1">
+                <a:solidFill>
+                  <a:srgbClr val="374151"/>
+                </a:solidFill>
+                <a:effectLst/>
+                <a:latin typeface="Söhne"/>
+              </a:rPr>
+              <a:t>SparkML</a:t>
+            </a:r>
+            <a:r>
+              <a:rPr lang="en-GB" sz="2000" b="0" i="0" dirty="0">
+                <a:solidFill>
+                  <a:srgbClr val="374151"/>
+                </a:solidFill>
+                <a:effectLst/>
+                <a:latin typeface="Söhne"/>
+              </a:rPr>
+              <a:t>: scalable and distributed machine learning library within Spark</a:t>
+            </a:r>
+          </a:p>
+          <a:p>
+            <a:pPr lvl="1"/>
+            <a:r>
+              <a:rPr lang="en-GB" sz="2000" b="0" i="0" dirty="0">
+                <a:solidFill>
+                  <a:srgbClr val="374151"/>
+                </a:solidFill>
+                <a:effectLst/>
+                <a:latin typeface="Söhne"/>
+              </a:rPr>
+              <a:t>Enables parallelized machine learning on large datasets</a:t>
+            </a:r>
+          </a:p>
+          <a:p>
+            <a:pPr lvl="1"/>
+            <a:r>
+              <a:rPr lang="en-GB" sz="2000" b="0" i="0" dirty="0">
+                <a:solidFill>
+                  <a:srgbClr val="374151"/>
+                </a:solidFill>
+                <a:effectLst/>
+                <a:latin typeface="Söhne"/>
+              </a:rPr>
+              <a:t>Lowers barrier of entry for distributed machine learning with high-level API</a:t>
+            </a:r>
+          </a:p>
+          <a:p>
+            <a:pPr lvl="1"/>
+            <a:r>
+              <a:rPr lang="en-GB" sz="2000" b="0" i="0" dirty="0">
+                <a:solidFill>
+                  <a:srgbClr val="374151"/>
+                </a:solidFill>
+                <a:effectLst/>
+                <a:latin typeface="Söhne"/>
+              </a:rPr>
+              <a:t>Includes popular machine learning algorithm implementations for efficient model deployment</a:t>
+            </a:r>
+          </a:p>
+          <a:p>
+            <a:endParaRPr lang="en-GB" dirty="0"/>
           </a:p>
         </p:txBody>
       </p:sp>
       <p:pic>
         <p:nvPicPr>
-          <p:cNvPr id="4" name="Picture 3">
+          <p:cNvPr id="5" name="Picture 4">
             <a:extLst>
               <a:ext uri="{FF2B5EF4-FFF2-40B4-BE49-F238E27FC236}">
-                <a16:creationId xmlns:a16="http://schemas.microsoft.com/office/drawing/2014/main" id="{771CD00C-EDCD-7E46-0B18-FAFCD67B648F}"/>
+                <a16:creationId xmlns:a16="http://schemas.microsoft.com/office/drawing/2014/main" id="{232495B9-DF80-8825-30B7-7B841E67B032}"/>
               </a:ext>
             </a:extLst>
           </p:cNvPr>
@@ -5781,8 +6316,8 @@
         </p:blipFill>
         <p:spPr>
           <a:xfrm>
-            <a:off x="1832102" y="3805682"/>
-            <a:ext cx="5930900" cy="673100"/>
+            <a:off x="7488820" y="559038"/>
+            <a:ext cx="4130882" cy="1540195"/>
           </a:xfrm>
           <a:prstGeom prst="rect">
             <a:avLst/>
@@ -5792,7 +6327,7 @@
     </p:spTree>
     <p:extLst>
       <p:ext uri="{BB962C8B-B14F-4D97-AF65-F5344CB8AC3E}">
-        <p14:creationId xmlns:p14="http://schemas.microsoft.com/office/powerpoint/2010/main" val="2785348309"/>
+        <p14:creationId xmlns:p14="http://schemas.microsoft.com/office/powerpoint/2010/main" val="22311966"/>
       </p:ext>
     </p:extLst>
   </p:cSld>
@@ -5824,7 +6359,7 @@
           <p:cNvPr id="2" name="Title 1">
             <a:extLst>
               <a:ext uri="{FF2B5EF4-FFF2-40B4-BE49-F238E27FC236}">
-                <a16:creationId xmlns:a16="http://schemas.microsoft.com/office/drawing/2014/main" id="{2528BF60-725A-BE17-4864-8FF6236313A4}"/>
+                <a16:creationId xmlns:a16="http://schemas.microsoft.com/office/drawing/2014/main" id="{13F5FC8E-E827-64C5-745D-CE8F44CD392F}"/>
               </a:ext>
             </a:extLst>
           </p:cNvPr>
@@ -5842,83 +6377,45 @@
           <a:p>
             <a:r>
               <a:rPr lang="en-US" dirty="0"/>
-              <a:t>Machine learning models chosen</a:t>
-            </a:r>
-          </a:p>
-        </p:txBody>
-      </p:sp>
-      <p:sp>
-        <p:nvSpPr>
-          <p:cNvPr id="3" name="Content Placeholder 2">
+              <a:t>Spark vs MapReduce</a:t>
+            </a:r>
+            <a:endParaRPr lang="en-GB" dirty="0"/>
+          </a:p>
+        </p:txBody>
+      </p:sp>
+      <p:pic>
+        <p:nvPicPr>
+          <p:cNvPr id="5" name="Content Placeholder 4" descr="A screenshot of a computer program&#10;&#10;Description automatically generated with low confidence">
             <a:extLst>
               <a:ext uri="{FF2B5EF4-FFF2-40B4-BE49-F238E27FC236}">
-                <a16:creationId xmlns:a16="http://schemas.microsoft.com/office/drawing/2014/main" id="{A7EF225D-6E39-C6D2-90E4-EA6FE3A1C050}"/>
+                <a16:creationId xmlns:a16="http://schemas.microsoft.com/office/drawing/2014/main" id="{DBA98A3C-6B62-82BB-2F79-5AF41F41839D}"/>
               </a:ext>
             </a:extLst>
           </p:cNvPr>
-          <p:cNvSpPr>
-            <a:spLocks noGrp="1"/>
-          </p:cNvSpPr>
+          <p:cNvPicPr>
+            <a:picLocks noGrp="1" noChangeAspect="1"/>
+          </p:cNvPicPr>
           <p:nvPr>
             <p:ph idx="1"/>
           </p:nvPr>
-        </p:nvSpPr>
-        <p:spPr/>
-        <p:txBody>
-          <a:bodyPr/>
-          <a:lstStyle/>
-          <a:p>
-            <a:r>
-              <a:rPr lang="en-US" dirty="0"/>
-              <a:t>Logistic Regression </a:t>
-            </a:r>
-          </a:p>
-          <a:p>
-            <a:r>
-              <a:rPr lang="en-US" dirty="0"/>
-              <a:t>Decision Tree Classifier</a:t>
-            </a:r>
-          </a:p>
-          <a:p>
-            <a:r>
-              <a:rPr lang="en-US" dirty="0"/>
-              <a:t>Random Forest Classifier</a:t>
-            </a:r>
-          </a:p>
-          <a:p>
-            <a:r>
-              <a:rPr lang="en-US" dirty="0"/>
-              <a:t>Gradient Boosted Classifier</a:t>
-            </a:r>
-          </a:p>
-          <a:p>
-            <a:r>
-              <a:rPr lang="en-US" dirty="0"/>
-              <a:t>Linear Support Vector Machine</a:t>
-            </a:r>
-          </a:p>
-          <a:p>
-            <a:r>
-              <a:rPr lang="en-US" dirty="0" err="1"/>
-              <a:t>Naives</a:t>
-            </a:r>
-            <a:r>
-              <a:rPr lang="en-US" dirty="0"/>
-              <a:t> Bayes</a:t>
-            </a:r>
-          </a:p>
-          <a:p>
-            <a:r>
-              <a:rPr lang="en-US" dirty="0"/>
-              <a:t>Factorization Machine Classifier</a:t>
-            </a:r>
-          </a:p>
-        </p:txBody>
-      </p:sp>
+        </p:nvPicPr>
+        <p:blipFill>
+          <a:blip r:embed="rId2"/>
+          <a:stretch>
+            <a:fillRect/>
+          </a:stretch>
+        </p:blipFill>
+        <p:spPr>
+          <a:xfrm>
+            <a:off x="2244033" y="650313"/>
+            <a:ext cx="8018365" cy="5912532"/>
+          </a:xfrm>
+        </p:spPr>
+      </p:pic>
     </p:spTree>
     <p:extLst>
       <p:ext uri="{BB962C8B-B14F-4D97-AF65-F5344CB8AC3E}">
-        <p14:creationId xmlns:p14="http://schemas.microsoft.com/office/powerpoint/2010/main" val="3064752663"/>
+        <p14:creationId xmlns:p14="http://schemas.microsoft.com/office/powerpoint/2010/main" val="2563309961"/>
       </p:ext>
     </p:extLst>
   </p:cSld>

</xml_diff>